<commit_message>
Project Manager updated to v1, typo in Storage Administrator fixed
</commit_message>
<xml_diff>
--- a/web console doc/Storage Administrator scenario - web console.pptx
+++ b/web console doc/Storage Administrator scenario - web console.pptx
@@ -122,7 +122,7 @@
   </p:defaultTextStyle>
   <p:extLst>
     <p:ext uri="{EFAFB233-063F-42B5-8137-9DF3F51BA10A}">
-      <p15:sldGuideLst xmlns="" xmlns:p15="http://schemas.microsoft.com/office/powerpoint/2012/main"/>
+      <p15:sldGuideLst xmlns:p15="http://schemas.microsoft.com/office/powerpoint/2012/main" xmlns=""/>
     </p:ext>
   </p:extLst>
 </p:presentation>
@@ -210,7 +210,7 @@
           <a:p>
             <a:fld id="{2A61FC54-96E1-1A4C-A783-DB39D2B24BDB}" type="datetimeFigureOut">
               <a:rPr lang="en-US" smtClean="0"/>
-              <a:t>14/05/2014</a:t>
+              <a:t>19/05/2014</a:t>
             </a:fld>
             <a:endParaRPr lang="en-US"/>
           </a:p>
@@ -9986,7 +9986,15 @@
           <a:p>
             <a:r>
               <a:rPr lang="en-US" dirty="0" smtClean="0"/>
-              <a:t>The Storage Manager can remove or edit a specific Storage Site, or create a new one by clicking the “New Storage Site” button.</a:t>
+              <a:t>The Storage </a:t>
+            </a:r>
+            <a:r>
+              <a:rPr lang="en-US" dirty="0" smtClean="0"/>
+              <a:t>Administrator can </a:t>
+            </a:r>
+            <a:r>
+              <a:rPr lang="en-US" dirty="0" smtClean="0"/>
+              <a:t>remove or edit a specific Storage Site, or create a new one by clicking the “New Storage Site” button.</a:t>
             </a:r>
             <a:endParaRPr lang="en-US" dirty="0"/>
           </a:p>

</xml_diff>